<commit_message>
Chap05: Modification of picture heating away.
</commit_message>
<xml_diff>
--- a/05-CrDyn/Pictures/DistandGap.pptx
+++ b/05-CrDyn/Pictures/DistandGap.pptx
@@ -288,7 +288,7 @@
           <a:p>
             <a:fld id="{E02029C7-0013-41CD-AA45-5AC734C7F128}" type="datetimeFigureOut">
               <a:rPr lang="fr-FR" smtClean="0"/>
-              <a:t>30/06/2017</a:t>
+              <a:t>03/07/2017</a:t>
             </a:fld>
             <a:endParaRPr lang="fr-FR"/>
           </a:p>
@@ -458,7 +458,7 @@
           <a:p>
             <a:fld id="{E02029C7-0013-41CD-AA45-5AC734C7F128}" type="datetimeFigureOut">
               <a:rPr lang="fr-FR" smtClean="0"/>
-              <a:t>30/06/2017</a:t>
+              <a:t>03/07/2017</a:t>
             </a:fld>
             <a:endParaRPr lang="fr-FR"/>
           </a:p>
@@ -638,7 +638,7 @@
           <a:p>
             <a:fld id="{E02029C7-0013-41CD-AA45-5AC734C7F128}" type="datetimeFigureOut">
               <a:rPr lang="fr-FR" smtClean="0"/>
-              <a:t>30/06/2017</a:t>
+              <a:t>03/07/2017</a:t>
             </a:fld>
             <a:endParaRPr lang="fr-FR"/>
           </a:p>
@@ -808,7 +808,7 @@
           <a:p>
             <a:fld id="{E02029C7-0013-41CD-AA45-5AC734C7F128}" type="datetimeFigureOut">
               <a:rPr lang="fr-FR" smtClean="0"/>
-              <a:t>30/06/2017</a:t>
+              <a:t>03/07/2017</a:t>
             </a:fld>
             <a:endParaRPr lang="fr-FR"/>
           </a:p>
@@ -1054,7 +1054,7 @@
           <a:p>
             <a:fld id="{E02029C7-0013-41CD-AA45-5AC734C7F128}" type="datetimeFigureOut">
               <a:rPr lang="fr-FR" smtClean="0"/>
-              <a:t>30/06/2017</a:t>
+              <a:t>03/07/2017</a:t>
             </a:fld>
             <a:endParaRPr lang="fr-FR"/>
           </a:p>
@@ -1342,7 +1342,7 @@
           <a:p>
             <a:fld id="{E02029C7-0013-41CD-AA45-5AC734C7F128}" type="datetimeFigureOut">
               <a:rPr lang="fr-FR" smtClean="0"/>
-              <a:t>30/06/2017</a:t>
+              <a:t>03/07/2017</a:t>
             </a:fld>
             <a:endParaRPr lang="fr-FR"/>
           </a:p>
@@ -1764,7 +1764,7 @@
           <a:p>
             <a:fld id="{E02029C7-0013-41CD-AA45-5AC734C7F128}" type="datetimeFigureOut">
               <a:rPr lang="fr-FR" smtClean="0"/>
-              <a:t>30/06/2017</a:t>
+              <a:t>03/07/2017</a:t>
             </a:fld>
             <a:endParaRPr lang="fr-FR"/>
           </a:p>
@@ -1882,7 +1882,7 @@
           <a:p>
             <a:fld id="{E02029C7-0013-41CD-AA45-5AC734C7F128}" type="datetimeFigureOut">
               <a:rPr lang="fr-FR" smtClean="0"/>
-              <a:t>30/06/2017</a:t>
+              <a:t>03/07/2017</a:t>
             </a:fld>
             <a:endParaRPr lang="fr-FR"/>
           </a:p>
@@ -1977,7 +1977,7 @@
           <a:p>
             <a:fld id="{E02029C7-0013-41CD-AA45-5AC734C7F128}" type="datetimeFigureOut">
               <a:rPr lang="fr-FR" smtClean="0"/>
-              <a:t>30/06/2017</a:t>
+              <a:t>03/07/2017</a:t>
             </a:fld>
             <a:endParaRPr lang="fr-FR"/>
           </a:p>
@@ -2254,7 +2254,7 @@
           <a:p>
             <a:fld id="{E02029C7-0013-41CD-AA45-5AC734C7F128}" type="datetimeFigureOut">
               <a:rPr lang="fr-FR" smtClean="0"/>
-              <a:t>30/06/2017</a:t>
+              <a:t>03/07/2017</a:t>
             </a:fld>
             <a:endParaRPr lang="fr-FR"/>
           </a:p>
@@ -2507,7 +2507,7 @@
           <a:p>
             <a:fld id="{E02029C7-0013-41CD-AA45-5AC734C7F128}" type="datetimeFigureOut">
               <a:rPr lang="fr-FR" smtClean="0"/>
-              <a:t>30/06/2017</a:t>
+              <a:t>03/07/2017</a:t>
             </a:fld>
             <a:endParaRPr lang="fr-FR"/>
           </a:p>
@@ -2720,7 +2720,7 @@
           <a:p>
             <a:fld id="{E02029C7-0013-41CD-AA45-5AC734C7F128}" type="datetimeFigureOut">
               <a:rPr lang="fr-FR" smtClean="0"/>
-              <a:t>30/06/2017</a:t>
+              <a:t>03/07/2017</a:t>
             </a:fld>
             <a:endParaRPr lang="fr-FR"/>
           </a:p>
@@ -4188,6 +4188,150 @@
           </a:extLst>
         </p:spPr>
       </p:pic>
+      <p:sp>
+        <p:nvSpPr>
+          <p:cNvPr id="2" name="ZoneTexte 1"/>
+          <p:cNvSpPr txBox="1"/>
+          <p:nvPr/>
+        </p:nvSpPr>
+        <p:spPr>
+          <a:xfrm>
+            <a:off x="-71784" y="216248"/>
+            <a:ext cx="526106" cy="461665"/>
+          </a:xfrm>
+          <a:prstGeom prst="rect">
+            <a:avLst/>
+          </a:prstGeom>
+          <a:noFill/>
+        </p:spPr>
+        <p:txBody>
+          <a:bodyPr wrap="none" rtlCol="0">
+            <a:spAutoFit/>
+          </a:bodyPr>
+          <a:lstStyle/>
+          <a:p>
+            <a:r>
+              <a:rPr lang="fr-FR" sz="2400" dirty="0" smtClean="0">
+                <a:latin typeface="Times New Roman" panose="02020603050405020304" pitchFamily="18" charset="0"/>
+                <a:cs typeface="Times New Roman" panose="02020603050405020304" pitchFamily="18" charset="0"/>
+              </a:rPr>
+              <a:t>(a)</a:t>
+            </a:r>
+            <a:endParaRPr lang="fr-FR" sz="2400" dirty="0">
+              <a:latin typeface="Times New Roman" panose="02020603050405020304" pitchFamily="18" charset="0"/>
+              <a:cs typeface="Times New Roman" panose="02020603050405020304" pitchFamily="18" charset="0"/>
+            </a:endParaRPr>
+          </a:p>
+        </p:txBody>
+      </p:sp>
+      <p:sp>
+        <p:nvSpPr>
+          <p:cNvPr id="31" name="ZoneTexte 30"/>
+          <p:cNvSpPr txBox="1"/>
+          <p:nvPr/>
+        </p:nvSpPr>
+        <p:spPr>
+          <a:xfrm>
+            <a:off x="3146526" y="216248"/>
+            <a:ext cx="543739" cy="461665"/>
+          </a:xfrm>
+          <a:prstGeom prst="rect">
+            <a:avLst/>
+          </a:prstGeom>
+          <a:noFill/>
+        </p:spPr>
+        <p:txBody>
+          <a:bodyPr wrap="none" rtlCol="0">
+            <a:spAutoFit/>
+          </a:bodyPr>
+          <a:lstStyle/>
+          <a:p>
+            <a:r>
+              <a:rPr lang="fr-FR" sz="2400" dirty="0" smtClean="0">
+                <a:latin typeface="Times New Roman" panose="02020603050405020304" pitchFamily="18" charset="0"/>
+                <a:cs typeface="Times New Roman" panose="02020603050405020304" pitchFamily="18" charset="0"/>
+              </a:rPr>
+              <a:t>(b)</a:t>
+            </a:r>
+            <a:endParaRPr lang="fr-FR" sz="2400" dirty="0">
+              <a:latin typeface="Times New Roman" panose="02020603050405020304" pitchFamily="18" charset="0"/>
+              <a:cs typeface="Times New Roman" panose="02020603050405020304" pitchFamily="18" charset="0"/>
+            </a:endParaRPr>
+          </a:p>
+        </p:txBody>
+      </p:sp>
+      <p:sp>
+        <p:nvSpPr>
+          <p:cNvPr id="32" name="ZoneTexte 31"/>
+          <p:cNvSpPr txBox="1"/>
+          <p:nvPr/>
+        </p:nvSpPr>
+        <p:spPr>
+          <a:xfrm>
+            <a:off x="6264920" y="216248"/>
+            <a:ext cx="526106" cy="461665"/>
+          </a:xfrm>
+          <a:prstGeom prst="rect">
+            <a:avLst/>
+          </a:prstGeom>
+          <a:noFill/>
+        </p:spPr>
+        <p:txBody>
+          <a:bodyPr wrap="none" rtlCol="0">
+            <a:spAutoFit/>
+          </a:bodyPr>
+          <a:lstStyle/>
+          <a:p>
+            <a:r>
+              <a:rPr lang="fr-FR" sz="2400" dirty="0" smtClean="0">
+                <a:latin typeface="Times New Roman" panose="02020603050405020304" pitchFamily="18" charset="0"/>
+                <a:cs typeface="Times New Roman" panose="02020603050405020304" pitchFamily="18" charset="0"/>
+              </a:rPr>
+              <a:t>(c)</a:t>
+            </a:r>
+            <a:endParaRPr lang="fr-FR" sz="2400" dirty="0">
+              <a:latin typeface="Times New Roman" panose="02020603050405020304" pitchFamily="18" charset="0"/>
+              <a:cs typeface="Times New Roman" panose="02020603050405020304" pitchFamily="18" charset="0"/>
+            </a:endParaRPr>
+          </a:p>
+        </p:txBody>
+      </p:sp>
+      <p:sp>
+        <p:nvSpPr>
+          <p:cNvPr id="33" name="ZoneTexte 32"/>
+          <p:cNvSpPr txBox="1"/>
+          <p:nvPr/>
+        </p:nvSpPr>
+        <p:spPr>
+          <a:xfrm>
+            <a:off x="3168576" y="4608736"/>
+            <a:ext cx="543739" cy="461665"/>
+          </a:xfrm>
+          <a:prstGeom prst="rect">
+            <a:avLst/>
+          </a:prstGeom>
+          <a:noFill/>
+        </p:spPr>
+        <p:txBody>
+          <a:bodyPr wrap="none" rtlCol="0">
+            <a:spAutoFit/>
+          </a:bodyPr>
+          <a:lstStyle/>
+          <a:p>
+            <a:r>
+              <a:rPr lang="fr-FR" sz="2400" dirty="0" smtClean="0">
+                <a:latin typeface="Times New Roman" panose="02020603050405020304" pitchFamily="18" charset="0"/>
+                <a:cs typeface="Times New Roman" panose="02020603050405020304" pitchFamily="18" charset="0"/>
+              </a:rPr>
+              <a:t>(d)</a:t>
+            </a:r>
+            <a:endParaRPr lang="fr-FR" sz="2400" dirty="0">
+              <a:latin typeface="Times New Roman" panose="02020603050405020304" pitchFamily="18" charset="0"/>
+              <a:cs typeface="Times New Roman" panose="02020603050405020304" pitchFamily="18" charset="0"/>
+            </a:endParaRPr>
+          </a:p>
+        </p:txBody>
+      </p:sp>
     </p:spTree>
     <p:extLst>
       <p:ext uri="{BB962C8B-B14F-4D97-AF65-F5344CB8AC3E}">

</xml_diff>